<commit_message>
Solved movements save properly
</commit_message>
<xml_diff>
--- a/Unity/Thesis_HJC885.pptx
+++ b/Unity/Thesis_HJC885.pptx
@@ -8612,7 +8612,7 @@
         </p:nvSpPr>
         <p:spPr>
           <a:xfrm>
-            <a:off x="934078" y="460375"/>
+            <a:off x="712945" y="342929"/>
             <a:ext cx="7411825" cy="1752599"/>
           </a:xfrm>
         </p:spPr>
@@ -8624,7 +8624,7 @@
           <a:p>
             <a:pPr algn="l"/>
             <a:r>
-              <a:rPr lang="hu-HU" dirty="0"/>
+              <a:rPr lang="hu-HU" sz="4800" dirty="0"/>
               <a:t>Bevezető</a:t>
             </a:r>
           </a:p>
@@ -8649,7 +8649,7 @@
         <p:spPr>
           <a:xfrm>
             <a:off x="712945" y="2317749"/>
-            <a:ext cx="7243603" cy="2719193"/>
+            <a:ext cx="7801881" cy="3579712"/>
           </a:xfrm>
         </p:spPr>
         <p:txBody>
@@ -8659,39 +8659,35 @@
           <a:lstStyle/>
           <a:p>
             <a:r>
-              <a:rPr lang="hu-HU" dirty="0"/>
+              <a:rPr lang="hu-HU" sz="3200" dirty="0"/>
               <a:t>Katonai felhasználás</a:t>
             </a:r>
           </a:p>
           <a:p>
             <a:pPr rtl="0"/>
             <a:r>
-              <a:rPr lang="hu-HU"/>
-              <a:t>Autós </a:t>
-            </a:r>
-            <a:r>
-              <a:rPr lang="hu-HU" dirty="0"/>
-              <a:t>balesetek megelőzése</a:t>
+              <a:rPr lang="hu-HU" sz="3200" dirty="0"/>
+              <a:t>Autós balesetek megelőzése</a:t>
             </a:r>
           </a:p>
           <a:p>
             <a:pPr rtl="0"/>
             <a:r>
-              <a:rPr lang="hu-HU" dirty="0"/>
+              <a:rPr lang="hu-HU" sz="3200" dirty="0"/>
               <a:t>Munkahelyi balesetek megelőzése</a:t>
             </a:r>
           </a:p>
           <a:p>
             <a:pPr rtl="0"/>
             <a:r>
-              <a:rPr lang="hu-HU" dirty="0"/>
+              <a:rPr lang="hu-HU" sz="3200" dirty="0"/>
               <a:t>Önvédelem</a:t>
             </a:r>
           </a:p>
           <a:p>
             <a:pPr rtl="0"/>
             <a:r>
-              <a:rPr lang="hu-HU" dirty="0"/>
+              <a:rPr lang="hu-HU" sz="3200" dirty="0"/>
               <a:t>Sport</a:t>
             </a:r>
           </a:p>
@@ -9272,7 +9268,7 @@
         </p:nvSpPr>
         <p:spPr>
           <a:xfrm>
-            <a:off x="1018191" y="685800"/>
+            <a:off x="354224" y="8733"/>
             <a:ext cx="7411825" cy="1752599"/>
           </a:xfrm>
         </p:spPr>
@@ -9285,7 +9281,7 @@
             <a:pPr algn="l"/>
             <a:r>
               <a:rPr lang="hu-HU" dirty="0"/>
-              <a:t>Cím Lorem Ipsum Dolor</a:t>
+              <a:t>Fő komponensek</a:t>
             </a:r>
           </a:p>
         </p:txBody>
@@ -9308,8 +9304,8 @@
         </p:nvSpPr>
         <p:spPr>
           <a:xfrm>
-            <a:off x="1018190" y="2666999"/>
-            <a:ext cx="7243603" cy="2719193"/>
+            <a:off x="67171" y="1459684"/>
+            <a:ext cx="9534027" cy="4279883"/>
           </a:xfrm>
         </p:spPr>
         <p:txBody>
@@ -9320,394 +9316,56 @@
           <a:p>
             <a:pPr rtl="0"/>
             <a:r>
-              <a:rPr lang="hu-HU" sz="1800" dirty="0" err="1"/>
-              <a:t>Lorem</a:t>
-            </a:r>
-            <a:r>
-              <a:rPr lang="hu-HU" sz="1800" dirty="0"/>
-              <a:t> </a:t>
-            </a:r>
-            <a:r>
-              <a:rPr lang="hu-HU" sz="1800" dirty="0" err="1"/>
-              <a:t>ipsum</a:t>
-            </a:r>
-            <a:r>
-              <a:rPr lang="hu-HU" sz="1800" dirty="0"/>
-              <a:t> </a:t>
-            </a:r>
-            <a:r>
-              <a:rPr lang="hu-HU" sz="1800" dirty="0" err="1"/>
-              <a:t>dolor</a:t>
-            </a:r>
-            <a:r>
-              <a:rPr lang="hu-HU" sz="1800" dirty="0"/>
-              <a:t> </a:t>
-            </a:r>
-            <a:r>
-              <a:rPr lang="hu-HU" sz="1800" dirty="0" err="1"/>
-              <a:t>sit</a:t>
-            </a:r>
-            <a:r>
-              <a:rPr lang="hu-HU" sz="1800" dirty="0"/>
-              <a:t> </a:t>
-            </a:r>
-            <a:r>
-              <a:rPr lang="hu-HU" sz="1800" dirty="0" err="1"/>
-              <a:t>amet</a:t>
-            </a:r>
-            <a:r>
-              <a:rPr lang="hu-HU" sz="1800" dirty="0"/>
-              <a:t>, </a:t>
-            </a:r>
-            <a:r>
-              <a:rPr lang="hu-HU" sz="1800" dirty="0" err="1"/>
-              <a:t>consectetuer</a:t>
-            </a:r>
-            <a:r>
-              <a:rPr lang="hu-HU" sz="1800" dirty="0"/>
-              <a:t> </a:t>
-            </a:r>
-            <a:r>
-              <a:rPr lang="hu-HU" sz="1800" dirty="0" err="1"/>
-              <a:t>adipiscing</a:t>
-            </a:r>
-            <a:r>
-              <a:rPr lang="hu-HU" sz="1800" dirty="0"/>
-              <a:t> elit. Maecenas </a:t>
-            </a:r>
-            <a:r>
-              <a:rPr lang="hu-HU" sz="1800" dirty="0" err="1"/>
-              <a:t>porttitor</a:t>
-            </a:r>
-            <a:r>
-              <a:rPr lang="hu-HU" sz="1800" dirty="0"/>
-              <a:t> </a:t>
-            </a:r>
-            <a:r>
-              <a:rPr lang="hu-HU" sz="1800" dirty="0" err="1"/>
-              <a:t>congue</a:t>
-            </a:r>
-            <a:r>
-              <a:rPr lang="hu-HU" sz="1800" dirty="0"/>
-              <a:t> </a:t>
-            </a:r>
-            <a:r>
-              <a:rPr lang="hu-HU" sz="1800" dirty="0" err="1"/>
-              <a:t>massa</a:t>
-            </a:r>
-            <a:r>
-              <a:rPr lang="hu-HU" sz="1800" dirty="0"/>
-              <a:t>. </a:t>
-            </a:r>
-            <a:r>
-              <a:rPr lang="hu-HU" sz="1800" dirty="0" err="1"/>
-              <a:t>Fusce</a:t>
-            </a:r>
-            <a:r>
-              <a:rPr lang="hu-HU" sz="1800" dirty="0"/>
-              <a:t> </a:t>
-            </a:r>
-            <a:r>
-              <a:rPr lang="hu-HU" sz="1800" dirty="0" err="1"/>
-              <a:t>posuere</a:t>
-            </a:r>
-            <a:r>
-              <a:rPr lang="hu-HU" sz="1800" dirty="0"/>
-              <a:t>, </a:t>
-            </a:r>
-            <a:r>
-              <a:rPr lang="hu-HU" sz="1800" dirty="0" err="1"/>
-              <a:t>magna</a:t>
-            </a:r>
-            <a:r>
-              <a:rPr lang="hu-HU" sz="1800" dirty="0"/>
-              <a:t> </a:t>
-            </a:r>
-            <a:r>
-              <a:rPr lang="hu-HU" sz="1800" dirty="0" err="1"/>
-              <a:t>sed</a:t>
-            </a:r>
-            <a:r>
-              <a:rPr lang="hu-HU" sz="1800" dirty="0"/>
-              <a:t> </a:t>
-            </a:r>
-            <a:r>
-              <a:rPr lang="hu-HU" sz="1800" dirty="0" err="1"/>
-              <a:t>pulvinar</a:t>
-            </a:r>
-            <a:r>
-              <a:rPr lang="hu-HU" sz="1800" dirty="0"/>
-              <a:t> </a:t>
-            </a:r>
-            <a:r>
-              <a:rPr lang="hu-HU" sz="1800" dirty="0" err="1"/>
-              <a:t>ultricies</a:t>
-            </a:r>
-            <a:r>
-              <a:rPr lang="hu-HU" sz="1800" dirty="0"/>
-              <a:t>, </a:t>
-            </a:r>
-            <a:r>
-              <a:rPr lang="hu-HU" sz="1800" dirty="0" err="1"/>
-              <a:t>purus</a:t>
-            </a:r>
-            <a:r>
-              <a:rPr lang="hu-HU" sz="1800" dirty="0"/>
-              <a:t> </a:t>
-            </a:r>
-            <a:r>
-              <a:rPr lang="hu-HU" sz="1800" dirty="0" err="1"/>
-              <a:t>lectus</a:t>
-            </a:r>
-            <a:r>
-              <a:rPr lang="hu-HU" sz="1800" dirty="0"/>
-              <a:t> </a:t>
-            </a:r>
-            <a:r>
-              <a:rPr lang="hu-HU" sz="1800" dirty="0" err="1"/>
-              <a:t>malesuada</a:t>
-            </a:r>
-            <a:r>
-              <a:rPr lang="hu-HU" sz="1800" dirty="0"/>
-              <a:t> </a:t>
-            </a:r>
-            <a:r>
-              <a:rPr lang="hu-HU" sz="1800" dirty="0" err="1"/>
-              <a:t>libero</a:t>
-            </a:r>
-            <a:r>
-              <a:rPr lang="hu-HU" sz="1800" dirty="0"/>
-              <a:t>, </a:t>
-            </a:r>
-            <a:r>
-              <a:rPr lang="hu-HU" sz="1800" dirty="0" err="1"/>
-              <a:t>sit</a:t>
-            </a:r>
-            <a:r>
-              <a:rPr lang="hu-HU" sz="1800" dirty="0"/>
-              <a:t> </a:t>
-            </a:r>
-            <a:r>
-              <a:rPr lang="hu-HU" sz="1800" dirty="0" err="1"/>
-              <a:t>amet</a:t>
-            </a:r>
-            <a:r>
-              <a:rPr lang="hu-HU" sz="1800" dirty="0"/>
-              <a:t> </a:t>
-            </a:r>
-            <a:r>
-              <a:rPr lang="hu-HU" sz="1800" dirty="0" err="1"/>
-              <a:t>commodo</a:t>
-            </a:r>
-            <a:r>
-              <a:rPr lang="hu-HU" sz="1800" dirty="0"/>
-              <a:t> </a:t>
-            </a:r>
-            <a:r>
-              <a:rPr lang="hu-HU" sz="1800" dirty="0" err="1"/>
-              <a:t>magna</a:t>
-            </a:r>
-            <a:r>
-              <a:rPr lang="hu-HU" sz="1800" dirty="0"/>
-              <a:t> </a:t>
-            </a:r>
-            <a:r>
-              <a:rPr lang="hu-HU" sz="1800" dirty="0" err="1"/>
-              <a:t>eros</a:t>
-            </a:r>
-            <a:r>
-              <a:rPr lang="hu-HU" sz="1800" dirty="0"/>
-              <a:t> </a:t>
-            </a:r>
-            <a:r>
-              <a:rPr lang="hu-HU" sz="1800" dirty="0" err="1"/>
-              <a:t>quis</a:t>
-            </a:r>
-            <a:r>
-              <a:rPr lang="hu-HU" sz="1800" dirty="0"/>
-              <a:t> urna.</a:t>
+              <a:rPr lang="hu-HU" sz="2800" dirty="0"/>
+              <a:t>Lövedék detektálása</a:t>
+            </a:r>
+          </a:p>
+          <a:p>
+            <a:pPr lvl="1"/>
+            <a:r>
+              <a:rPr lang="hu-HU" sz="2400" dirty="0"/>
+              <a:t>Veszély megjóslása</a:t>
+            </a:r>
+          </a:p>
+          <a:p>
+            <a:pPr lvl="1"/>
+            <a:r>
+              <a:rPr lang="hu-HU" sz="2400" dirty="0"/>
+              <a:t>Irány meghatározása</a:t>
             </a:r>
           </a:p>
           <a:p>
             <a:pPr rtl="0"/>
             <a:r>
-              <a:rPr lang="hu-HU" sz="1800" dirty="0" err="1"/>
-              <a:t>Nunc</a:t>
-            </a:r>
-            <a:r>
-              <a:rPr lang="hu-HU" sz="1800" dirty="0"/>
-              <a:t> </a:t>
-            </a:r>
-            <a:r>
-              <a:rPr lang="hu-HU" sz="1800" dirty="0" err="1"/>
-              <a:t>viverra</a:t>
-            </a:r>
-            <a:r>
-              <a:rPr lang="hu-HU" sz="1800" dirty="0"/>
-              <a:t> </a:t>
-            </a:r>
-            <a:r>
-              <a:rPr lang="hu-HU" sz="1800" dirty="0" err="1"/>
-              <a:t>imperdiet</a:t>
-            </a:r>
-            <a:r>
-              <a:rPr lang="hu-HU" sz="1800" dirty="0"/>
-              <a:t> </a:t>
-            </a:r>
-            <a:r>
-              <a:rPr lang="hu-HU" sz="1800" dirty="0" err="1"/>
-              <a:t>enim</a:t>
-            </a:r>
-            <a:r>
-              <a:rPr lang="hu-HU" sz="1800" dirty="0"/>
-              <a:t>. </a:t>
-            </a:r>
-            <a:r>
-              <a:rPr lang="hu-HU" sz="1800" dirty="0" err="1"/>
-              <a:t>Fusce</a:t>
-            </a:r>
-            <a:r>
-              <a:rPr lang="hu-HU" sz="1800" dirty="0"/>
-              <a:t> est. </a:t>
-            </a:r>
-            <a:r>
-              <a:rPr lang="hu-HU" sz="1800" dirty="0" err="1"/>
-              <a:t>Vivamus</a:t>
-            </a:r>
-            <a:r>
-              <a:rPr lang="hu-HU" sz="1800" dirty="0"/>
-              <a:t> a </a:t>
-            </a:r>
-            <a:r>
-              <a:rPr lang="hu-HU" sz="1800" dirty="0" err="1"/>
-              <a:t>tellus</a:t>
-            </a:r>
-            <a:r>
-              <a:rPr lang="hu-HU" sz="1800" dirty="0"/>
-              <a:t>.</a:t>
-            </a:r>
-          </a:p>
-          <a:p>
-            <a:pPr rtl="0"/>
-            <a:r>
-              <a:rPr lang="hu-HU" sz="1800" dirty="0" err="1"/>
-              <a:t>Pellentesque</a:t>
-            </a:r>
-            <a:r>
-              <a:rPr lang="hu-HU" sz="1800" dirty="0"/>
-              <a:t> habitant </a:t>
-            </a:r>
-            <a:r>
-              <a:rPr lang="hu-HU" sz="1800" dirty="0" err="1"/>
-              <a:t>morbi</a:t>
-            </a:r>
-            <a:r>
-              <a:rPr lang="hu-HU" sz="1800" dirty="0"/>
-              <a:t> </a:t>
-            </a:r>
-            <a:r>
-              <a:rPr lang="hu-HU" sz="1800" dirty="0" err="1"/>
-              <a:t>tristique</a:t>
-            </a:r>
-            <a:r>
-              <a:rPr lang="hu-HU" sz="1800" dirty="0"/>
-              <a:t> </a:t>
-            </a:r>
-            <a:r>
-              <a:rPr lang="hu-HU" sz="1800" dirty="0" err="1"/>
-              <a:t>senectus</a:t>
-            </a:r>
-            <a:r>
-              <a:rPr lang="hu-HU" sz="1800" dirty="0"/>
-              <a:t> et </a:t>
-            </a:r>
-            <a:r>
-              <a:rPr lang="hu-HU" sz="1800" dirty="0" err="1"/>
-              <a:t>netus</a:t>
-            </a:r>
-            <a:r>
-              <a:rPr lang="hu-HU" sz="1800" dirty="0"/>
-              <a:t> et </a:t>
-            </a:r>
-            <a:r>
-              <a:rPr lang="hu-HU" sz="1800" dirty="0" err="1"/>
-              <a:t>malesuada</a:t>
-            </a:r>
-            <a:r>
-              <a:rPr lang="hu-HU" sz="1800" dirty="0"/>
-              <a:t> </a:t>
-            </a:r>
-            <a:r>
-              <a:rPr lang="hu-HU" sz="1800" dirty="0" err="1"/>
-              <a:t>fames</a:t>
-            </a:r>
-            <a:r>
-              <a:rPr lang="hu-HU" sz="1800" dirty="0"/>
-              <a:t> </a:t>
-            </a:r>
-            <a:r>
-              <a:rPr lang="hu-HU" sz="1800" dirty="0" err="1"/>
-              <a:t>ac</a:t>
-            </a:r>
-            <a:r>
-              <a:rPr lang="hu-HU" sz="1800" dirty="0"/>
-              <a:t> turpis </a:t>
-            </a:r>
-            <a:r>
-              <a:rPr lang="hu-HU" sz="1800" dirty="0" err="1"/>
-              <a:t>egestas</a:t>
-            </a:r>
-            <a:r>
-              <a:rPr lang="hu-HU" sz="1800" dirty="0"/>
-              <a:t>. </a:t>
-            </a:r>
-            <a:r>
-              <a:rPr lang="hu-HU" sz="1800" dirty="0" err="1"/>
-              <a:t>Proin</a:t>
-            </a:r>
-            <a:r>
-              <a:rPr lang="hu-HU" sz="1800" dirty="0"/>
-              <a:t> </a:t>
-            </a:r>
-            <a:r>
-              <a:rPr lang="hu-HU" sz="1800" dirty="0" err="1"/>
-              <a:t>pharetra</a:t>
-            </a:r>
-            <a:r>
-              <a:rPr lang="hu-HU" sz="1800" dirty="0"/>
-              <a:t> </a:t>
-            </a:r>
-            <a:r>
-              <a:rPr lang="hu-HU" sz="1800" dirty="0" err="1"/>
-              <a:t>nonummy</a:t>
-            </a:r>
-            <a:r>
-              <a:rPr lang="hu-HU" sz="1800" dirty="0"/>
-              <a:t> </a:t>
-            </a:r>
-            <a:r>
-              <a:rPr lang="hu-HU" sz="1800" dirty="0" err="1"/>
-              <a:t>pede</a:t>
-            </a:r>
-            <a:r>
-              <a:rPr lang="hu-HU" sz="1800" dirty="0"/>
-              <a:t>. </a:t>
-            </a:r>
-            <a:r>
-              <a:rPr lang="hu-HU" sz="1800" dirty="0" err="1"/>
-              <a:t>Mauris</a:t>
-            </a:r>
-            <a:r>
-              <a:rPr lang="hu-HU" sz="1800" dirty="0"/>
-              <a:t> et </a:t>
-            </a:r>
-            <a:r>
-              <a:rPr lang="hu-HU" sz="1800" dirty="0" err="1"/>
-              <a:t>orci</a:t>
-            </a:r>
-            <a:r>
-              <a:rPr lang="hu-HU" sz="1800" dirty="0"/>
-              <a:t>.</a:t>
+              <a:rPr lang="hu-HU" sz="2800" dirty="0"/>
+              <a:t>Lövedék elkerülése</a:t>
+            </a:r>
+          </a:p>
+          <a:p>
+            <a:pPr lvl="1"/>
+            <a:r>
+              <a:rPr lang="hu-HU" dirty="0"/>
+              <a:t>Irány azonosítása</a:t>
+            </a:r>
+          </a:p>
+          <a:p>
+            <a:pPr lvl="1"/>
+            <a:r>
+              <a:rPr lang="hu-HU" dirty="0"/>
+              <a:t>Balesetmentes mozdulat kivitelezése</a:t>
+            </a:r>
+          </a:p>
+          <a:p>
+            <a:r>
+              <a:rPr lang="hu-HU" sz="2800" dirty="0"/>
+              <a:t>Összekötő réteg</a:t>
+            </a:r>
+          </a:p>
+          <a:p>
+            <a:pPr lvl="1"/>
+            <a:r>
+              <a:rPr lang="hu-HU" dirty="0"/>
+              <a:t>Lövedék detektálása-&gt;lövés információk-&gt;Lövedék elkerülése</a:t>
             </a:r>
           </a:p>
           <a:p>

</xml_diff>